<commit_message>
fixed wrong image of half adder
</commit_message>
<xml_diff>
--- a/submission/Presentation.pptx
+++ b/submission/Presentation.pptx
@@ -231,7 +231,7 @@
             <a:fld id="{40E7A1F5-5AB7-41A7-8530-9A81FE7C962B}" type="datetimeFigureOut">
               <a:rPr lang="de-DE" smtClean="0"/>
               <a:pPr/>
-              <a:t>27.05.2025</a:t>
+              <a:t>28.05.2025</a:t>
             </a:fld>
             <a:endParaRPr lang="de-DE"/>
           </a:p>
@@ -705,7 +705,7 @@
             <a:fld id="{2775B46C-1E65-4676-9833-45B8FEC312A7}" type="datetimeFigureOut">
               <a:rPr lang="de-DE" smtClean="0"/>
               <a:pPr/>
-              <a:t>27.05.2025</a:t>
+              <a:t>28.05.2025</a:t>
             </a:fld>
             <a:endParaRPr lang="de-DE"/>
           </a:p>
@@ -962,7 +962,7 @@
             <a:fld id="{2775B46C-1E65-4676-9833-45B8FEC312A7}" type="datetimeFigureOut">
               <a:rPr lang="de-DE" smtClean="0"/>
               <a:pPr/>
-              <a:t>27.05.2025</a:t>
+              <a:t>28.05.2025</a:t>
             </a:fld>
             <a:endParaRPr lang="de-DE"/>
           </a:p>
@@ -1139,7 +1139,7 @@
             <a:fld id="{2775B46C-1E65-4676-9833-45B8FEC312A7}" type="datetimeFigureOut">
               <a:rPr lang="de-DE" smtClean="0"/>
               <a:pPr/>
-              <a:t>27.05.2025</a:t>
+              <a:t>28.05.2025</a:t>
             </a:fld>
             <a:endParaRPr lang="de-DE"/>
           </a:p>
@@ -1342,7 +1342,7 @@
             <a:fld id="{2775B46C-1E65-4676-9833-45B8FEC312A7}" type="datetimeFigureOut">
               <a:rPr lang="de-DE" smtClean="0"/>
               <a:pPr/>
-              <a:t>27.05.2025</a:t>
+              <a:t>28.05.2025</a:t>
             </a:fld>
             <a:endParaRPr lang="de-DE"/>
           </a:p>
@@ -1613,7 +1613,7 @@
             <a:fld id="{2775B46C-1E65-4676-9833-45B8FEC312A7}" type="datetimeFigureOut">
               <a:rPr lang="de-DE" smtClean="0"/>
               <a:pPr/>
-              <a:t>27.05.2025</a:t>
+              <a:t>28.05.2025</a:t>
             </a:fld>
             <a:endParaRPr lang="de-DE"/>
           </a:p>
@@ -1898,7 +1898,7 @@
             <a:fld id="{2775B46C-1E65-4676-9833-45B8FEC312A7}" type="datetimeFigureOut">
               <a:rPr lang="de-DE" smtClean="0"/>
               <a:pPr/>
-              <a:t>27.05.2025</a:t>
+              <a:t>28.05.2025</a:t>
             </a:fld>
             <a:endParaRPr lang="de-DE"/>
           </a:p>
@@ -2317,7 +2317,7 @@
             <a:fld id="{2775B46C-1E65-4676-9833-45B8FEC312A7}" type="datetimeFigureOut">
               <a:rPr lang="de-DE" smtClean="0"/>
               <a:pPr/>
-              <a:t>27.05.2025</a:t>
+              <a:t>28.05.2025</a:t>
             </a:fld>
             <a:endParaRPr lang="de-DE"/>
           </a:p>
@@ -2432,7 +2432,7 @@
             <a:fld id="{2775B46C-1E65-4676-9833-45B8FEC312A7}" type="datetimeFigureOut">
               <a:rPr lang="de-DE" smtClean="0"/>
               <a:pPr/>
-              <a:t>27.05.2025</a:t>
+              <a:t>28.05.2025</a:t>
             </a:fld>
             <a:endParaRPr lang="de-DE"/>
           </a:p>
@@ -2524,7 +2524,7 @@
             <a:fld id="{2775B46C-1E65-4676-9833-45B8FEC312A7}" type="datetimeFigureOut">
               <a:rPr lang="de-DE" smtClean="0"/>
               <a:pPr/>
-              <a:t>27.05.2025</a:t>
+              <a:t>28.05.2025</a:t>
             </a:fld>
             <a:endParaRPr lang="de-DE"/>
           </a:p>
@@ -2798,7 +2798,7 @@
             <a:fld id="{2775B46C-1E65-4676-9833-45B8FEC312A7}" type="datetimeFigureOut">
               <a:rPr lang="de-DE" smtClean="0"/>
               <a:pPr/>
-              <a:t>27.05.2025</a:t>
+              <a:t>28.05.2025</a:t>
             </a:fld>
             <a:endParaRPr lang="de-DE"/>
           </a:p>
@@ -3048,7 +3048,7 @@
             <a:fld id="{2775B46C-1E65-4676-9833-45B8FEC312A7}" type="datetimeFigureOut">
               <a:rPr lang="de-DE" smtClean="0"/>
               <a:pPr/>
-              <a:t>27.05.2025</a:t>
+              <a:t>28.05.2025</a:t>
             </a:fld>
             <a:endParaRPr lang="de-DE"/>
           </a:p>
@@ -3258,7 +3258,7 @@
             <a:fld id="{2775B46C-1E65-4676-9833-45B8FEC312A7}" type="datetimeFigureOut">
               <a:rPr lang="de-DE" smtClean="0"/>
               <a:pPr/>
-              <a:t>27.05.2025</a:t>
+              <a:t>28.05.2025</a:t>
             </a:fld>
             <a:endParaRPr lang="de-DE"/>
           </a:p>
@@ -3865,11 +3865,7 @@
           <a:p>
             <a:r>
               <a:rPr lang="de-DE" dirty="0" smtClean="0"/>
-              <a:t>3.1: </a:t>
-            </a:r>
-            <a:r>
-              <a:rPr lang="de-DE" dirty="0" smtClean="0"/>
-              <a:t>B-</a:t>
+              <a:t>3.1: B-</a:t>
             </a:r>
             <a:r>
               <a:rPr lang="de-DE" dirty="0" err="1" smtClean="0"/>
@@ -3885,11 +3881,7 @@
             </a:r>
             <a:r>
               <a:rPr lang="de-DE" dirty="0" smtClean="0"/>
-              <a:t> </a:t>
-            </a:r>
-            <a:r>
-              <a:rPr lang="de-DE" dirty="0" smtClean="0"/>
-              <a:t>1 </a:t>
+              <a:t> 1 </a:t>
             </a:r>
             <a:r>
               <a:rPr lang="de-DE" dirty="0" err="1" smtClean="0"/>
@@ -4008,11 +4000,7 @@
           <a:p>
             <a:r>
               <a:rPr lang="de-DE" dirty="0" smtClean="0"/>
-              <a:t>3.1: </a:t>
-            </a:r>
-            <a:r>
-              <a:rPr lang="de-DE" dirty="0" smtClean="0"/>
-              <a:t>B-</a:t>
+              <a:t>3.1: B-</a:t>
             </a:r>
             <a:r>
               <a:rPr lang="de-DE" dirty="0" err="1" smtClean="0"/>
@@ -4028,11 +4016,7 @@
             </a:r>
             <a:r>
               <a:rPr lang="de-DE" dirty="0" smtClean="0"/>
-              <a:t> </a:t>
-            </a:r>
-            <a:r>
-              <a:rPr lang="de-DE" dirty="0" smtClean="0"/>
-              <a:t>1 </a:t>
+              <a:t> 1 </a:t>
             </a:r>
             <a:r>
               <a:rPr lang="de-DE" dirty="0" err="1" smtClean="0"/>
@@ -4521,15 +4505,7 @@
             </a:r>
             <a:r>
               <a:rPr lang="de-DE" dirty="0" smtClean="0"/>
-              <a:t> </a:t>
-            </a:r>
-            <a:r>
-              <a:rPr lang="de-DE" dirty="0" smtClean="0"/>
-              <a:t>4</a:t>
-            </a:r>
-            <a:r>
-              <a:rPr lang="de-DE" dirty="0" smtClean="0"/>
-              <a:t/>
+              <a:t> 4</a:t>
             </a:r>
             <a:br>
               <a:rPr lang="de-DE" dirty="0" smtClean="0"/>
@@ -4602,19 +4578,7 @@
           <a:p>
             <a:r>
               <a:rPr lang="de-DE" dirty="0" smtClean="0"/>
-              <a:t>4.1</a:t>
-            </a:r>
-            <a:r>
-              <a:rPr lang="de-DE" dirty="0" smtClean="0"/>
-              <a:t>: </a:t>
-            </a:r>
-            <a:r>
-              <a:rPr lang="de-DE" dirty="0" smtClean="0"/>
-              <a:t>Logical Unit </a:t>
-            </a:r>
-            <a:r>
-              <a:rPr lang="de-DE" dirty="0" smtClean="0"/>
-              <a:t>1 </a:t>
+              <a:t>4.1: Logical Unit 1 </a:t>
             </a:r>
             <a:r>
               <a:rPr lang="de-DE" dirty="0" err="1" smtClean="0"/>
@@ -4849,15 +4813,7 @@
             </a:r>
             <a:r>
               <a:rPr lang="de-DE" dirty="0" smtClean="0"/>
-              <a:t> </a:t>
-            </a:r>
-            <a:r>
-              <a:rPr lang="de-DE" dirty="0" smtClean="0"/>
-              <a:t>5</a:t>
-            </a:r>
-            <a:r>
-              <a:rPr lang="de-DE" dirty="0" smtClean="0"/>
-              <a:t/>
+              <a:t> 5</a:t>
             </a:r>
             <a:br>
               <a:rPr lang="de-DE" dirty="0" smtClean="0"/>
@@ -4923,15 +4879,7 @@
             </a:r>
             <a:r>
               <a:rPr lang="de-DE" dirty="0" smtClean="0"/>
-              <a:t> </a:t>
-            </a:r>
-            <a:r>
-              <a:rPr lang="de-DE" dirty="0" smtClean="0"/>
-              <a:t>1</a:t>
-            </a:r>
-            <a:r>
-              <a:rPr lang="de-DE" dirty="0" smtClean="0"/>
-              <a:t/>
+              <a:t> 1</a:t>
             </a:r>
             <a:br>
               <a:rPr lang="de-DE" dirty="0" smtClean="0"/>
@@ -5227,15 +5175,7 @@
             </a:r>
             <a:r>
               <a:rPr lang="de-DE" dirty="0" smtClean="0"/>
-              <a:t> </a:t>
-            </a:r>
-            <a:r>
-              <a:rPr lang="de-DE" dirty="0" smtClean="0"/>
-              <a:t>6</a:t>
-            </a:r>
-            <a:r>
-              <a:rPr lang="de-DE" dirty="0" smtClean="0"/>
-              <a:t/>
+              <a:t> 6</a:t>
             </a:r>
             <a:br>
               <a:rPr lang="de-DE" dirty="0" smtClean="0"/>
@@ -5304,19 +5244,7 @@
           <a:p>
             <a:r>
               <a:rPr lang="de-DE" dirty="0" smtClean="0"/>
-              <a:t>6.1</a:t>
-            </a:r>
-            <a:r>
-              <a:rPr lang="de-DE" dirty="0" smtClean="0"/>
-              <a:t>: </a:t>
-            </a:r>
-            <a:r>
-              <a:rPr lang="de-DE" dirty="0" smtClean="0"/>
-              <a:t>ALU </a:t>
-            </a:r>
-            <a:r>
-              <a:rPr lang="de-DE" dirty="0" smtClean="0"/>
-              <a:t>1 </a:t>
+              <a:t>6.1: ALU 1 </a:t>
             </a:r>
             <a:r>
               <a:rPr lang="de-DE" dirty="0" err="1" smtClean="0"/>
@@ -5435,15 +5363,7 @@
           <a:p>
             <a:r>
               <a:rPr lang="de-DE" dirty="0" smtClean="0"/>
-              <a:t>6.2: </a:t>
-            </a:r>
-            <a:r>
-              <a:rPr lang="de-DE" dirty="0" smtClean="0"/>
-              <a:t>ALU </a:t>
-            </a:r>
-            <a:r>
-              <a:rPr lang="de-DE" dirty="0" smtClean="0"/>
-              <a:t>n </a:t>
+              <a:t>6.2: ALU n </a:t>
             </a:r>
             <a:r>
               <a:rPr lang="de-DE" dirty="0" err="1" smtClean="0"/>
@@ -6100,11 +6020,7 @@
             </a:r>
             <a:r>
               <a:rPr lang="de-DE" sz="2800" dirty="0" smtClean="0"/>
-              <a:t> Circuit </a:t>
-            </a:r>
-            <a:r>
-              <a:rPr lang="de-DE" sz="2800" dirty="0" smtClean="0"/>
-              <a:t>Generation</a:t>
+              <a:t> Circuit Generation</a:t>
             </a:r>
           </a:p>
           <a:p>
@@ -6149,11 +6065,7 @@
             </a:r>
             <a:r>
               <a:rPr lang="de-DE" sz="2800" dirty="0" smtClean="0"/>
-              <a:t> </a:t>
-            </a:r>
-            <a:r>
-              <a:rPr lang="de-DE" sz="2800" dirty="0" smtClean="0"/>
-              <a:t>K-</a:t>
+              <a:t> K-</a:t>
             </a:r>
             <a:r>
               <a:rPr lang="de-DE" sz="2800" dirty="0" err="1" smtClean="0"/>
@@ -6374,7 +6286,6 @@
               <a:rPr lang="de-DE" sz="2800" dirty="0" smtClean="0"/>
               <a:t>:</a:t>
             </a:r>
-            <a:endParaRPr lang="de-DE" sz="2800" dirty="0" smtClean="0"/>
           </a:p>
         </p:txBody>
       </p:sp>
@@ -6867,7 +6778,6 @@
               <a:rPr lang="de-DE" sz="2800" dirty="0" smtClean="0"/>
               <a:t>:</a:t>
             </a:r>
-            <a:endParaRPr lang="de-DE" sz="2800" dirty="0" smtClean="0"/>
           </a:p>
         </p:txBody>
       </p:sp>
@@ -7469,11 +7379,7 @@
             </a:r>
             <a:r>
               <a:rPr lang="de-DE" sz="2800" dirty="0" smtClean="0"/>
-              <a:t> </a:t>
-            </a:r>
-            <a:r>
-              <a:rPr lang="de-DE" sz="2800" dirty="0" smtClean="0"/>
-              <a:t>Simulation</a:t>
+              <a:t> Simulation</a:t>
             </a:r>
           </a:p>
           <a:p>
@@ -7483,11 +7389,7 @@
             </a:r>
             <a:r>
               <a:rPr lang="de-DE" sz="2800" dirty="0" smtClean="0"/>
-              <a:t> Circuit </a:t>
-            </a:r>
-            <a:r>
-              <a:rPr lang="de-DE" sz="2800" dirty="0" smtClean="0"/>
-              <a:t>Generation</a:t>
+              <a:t> Circuit Generation</a:t>
             </a:r>
           </a:p>
           <a:p>
@@ -7505,11 +7407,7 @@
             </a:r>
             <a:r>
               <a:rPr lang="de-DE" sz="2800" dirty="0" smtClean="0"/>
-              <a:t> </a:t>
-            </a:r>
-            <a:r>
-              <a:rPr lang="de-DE" sz="2800" dirty="0" smtClean="0"/>
-              <a:t>Test </a:t>
+              <a:t> Test </a:t>
             </a:r>
             <a:r>
               <a:rPr lang="de-DE" sz="2800" dirty="0" err="1" smtClean="0"/>
@@ -7532,11 +7430,7 @@
             </a:r>
             <a:r>
               <a:rPr lang="de-DE" sz="2800" dirty="0" smtClean="0"/>
-              <a:t> </a:t>
-            </a:r>
-            <a:r>
-              <a:rPr lang="de-DE" sz="2800" dirty="0" smtClean="0"/>
-              <a:t>K-</a:t>
+              <a:t> K-</a:t>
             </a:r>
             <a:r>
               <a:rPr lang="de-DE" sz="2800" dirty="0" err="1" smtClean="0"/>
@@ -7609,11 +7503,7 @@
           <a:p>
             <a:r>
               <a:rPr lang="de-DE" dirty="0" smtClean="0"/>
-              <a:t>2.3</a:t>
-            </a:r>
-            <a:r>
-              <a:rPr lang="de-DE" dirty="0" smtClean="0"/>
-              <a:t>: </a:t>
+              <a:t>2.3: </a:t>
             </a:r>
             <a:r>
               <a:rPr lang="de-DE" dirty="0" err="1" smtClean="0"/>
@@ -7668,7 +7558,6 @@
               <a:rPr lang="de-DE" sz="2800" dirty="0" smtClean="0"/>
               <a:t>:</a:t>
             </a:r>
-            <a:endParaRPr lang="de-DE" sz="2800" dirty="0" smtClean="0"/>
           </a:p>
         </p:txBody>
       </p:sp>
@@ -8266,15 +8155,7 @@
           <a:p>
             <a:r>
               <a:rPr lang="de-DE" dirty="0" smtClean="0"/>
-              <a:t>3.1</a:t>
-            </a:r>
-            <a:r>
-              <a:rPr lang="de-DE" dirty="0" smtClean="0"/>
-              <a:t>: </a:t>
-            </a:r>
-            <a:r>
-              <a:rPr lang="de-DE" dirty="0" smtClean="0"/>
-              <a:t>B-</a:t>
+              <a:t>3.1: B-</a:t>
             </a:r>
             <a:r>
               <a:rPr lang="de-DE" dirty="0" err="1" smtClean="0"/>
@@ -8357,13 +8238,8 @@
             </a:pPr>
             <a:r>
               <a:rPr lang="en-US" dirty="0" smtClean="0"/>
-              <a:t>S0 S1 B </a:t>
-            </a:r>
-            <a:r>
-              <a:rPr lang="en-US" dirty="0" smtClean="0"/>
-              <a:t>Y</a:t>
-            </a:r>
-            <a:endParaRPr lang="en-US" dirty="0" smtClean="0"/>
+              <a:t>S0 S1 B Y</a:t>
+            </a:r>
           </a:p>
           <a:p>
             <a:pPr marL="342900" lvl="0" indent="-342900">
@@ -8888,11 +8764,7 @@
             </a:pPr>
             <a:r>
               <a:rPr lang="de-DE" sz="2000" dirty="0" smtClean="0"/>
-              <a:t>- Understanding </a:t>
-            </a:r>
-            <a:r>
-              <a:rPr lang="de-DE" sz="2000" dirty="0" smtClean="0"/>
-              <a:t>b̄ </a:t>
+              <a:t>- Understanding b̄ </a:t>
             </a:r>
             <a:r>
               <a:rPr lang="de-DE" sz="2000" dirty="0" err="1" smtClean="0"/>
@@ -10100,11 +9972,7 @@
             </a:pPr>
             <a:r>
               <a:rPr lang="de-DE" sz="2000" dirty="0" smtClean="0"/>
-              <a:t>- </a:t>
-            </a:r>
-            <a:r>
-              <a:rPr lang="de-DE" sz="2000" dirty="0" smtClean="0"/>
-              <a:t>„N“ </a:t>
+              <a:t>- „N“ </a:t>
             </a:r>
             <a:r>
               <a:rPr lang="de-DE" sz="2000" dirty="0" err="1" smtClean="0"/>
@@ -10237,11 +10105,7 @@
           <a:p>
             <a:r>
               <a:rPr lang="de-DE" dirty="0" smtClean="0"/>
-              <a:t>3.3</a:t>
-            </a:r>
-            <a:r>
-              <a:rPr lang="de-DE" dirty="0" smtClean="0"/>
-              <a:t>: </a:t>
+              <a:t>3.3: </a:t>
             </a:r>
             <a:r>
               <a:rPr lang="de-DE" dirty="0" err="1" smtClean="0"/>
@@ -10257,11 +10121,7 @@
             </a:r>
             <a:r>
               <a:rPr lang="de-DE" dirty="0" smtClean="0"/>
-              <a:t> </a:t>
-            </a:r>
-            <a:r>
-              <a:rPr lang="de-DE" dirty="0" smtClean="0"/>
-              <a:t>1bit</a:t>
+              <a:t> 1bit</a:t>
             </a:r>
             <a:endParaRPr lang="de-DE" dirty="0"/>
           </a:p>
@@ -10547,13 +10407,8 @@
             </a:pPr>
             <a:r>
               <a:rPr lang="en-US" sz="1200" dirty="0" smtClean="0"/>
-              <a:t>0 1 1 1 1 1 </a:t>
-            </a:r>
-            <a:r>
-              <a:rPr lang="en-US" sz="1200" dirty="0" smtClean="0"/>
-              <a:t>1</a:t>
-            </a:r>
-            <a:endParaRPr lang="en-US" sz="1200" dirty="0" smtClean="0"/>
+              <a:t>0 1 1 1 1 1 1</a:t>
+            </a:r>
           </a:p>
         </p:txBody>
       </p:sp>
@@ -12101,11 +11956,7 @@
             </a:pPr>
             <a:r>
               <a:rPr lang="en-US" sz="1000" dirty="0" smtClean="0"/>
-              <a:t># </a:t>
-            </a:r>
-            <a:r>
-              <a:rPr lang="en-US" sz="1000" dirty="0" smtClean="0"/>
-              <a:t>A + -B (subtraction -1 )</a:t>
+              <a:t># A + -B (subtraction -1 )</a:t>
             </a:r>
           </a:p>
           <a:p>
@@ -12403,15 +12254,7 @@
           <a:p>
             <a:r>
               <a:rPr lang="de-DE" dirty="0" smtClean="0"/>
-              <a:t>4.1</a:t>
-            </a:r>
-            <a:r>
-              <a:rPr lang="de-DE" dirty="0" smtClean="0"/>
-              <a:t>: </a:t>
-            </a:r>
-            <a:r>
-              <a:rPr lang="de-DE" dirty="0" smtClean="0"/>
-              <a:t>Logical Unit 1bit</a:t>
+              <a:t>4.1: Logical Unit 1bit</a:t>
             </a:r>
             <a:endParaRPr lang="de-DE" dirty="0"/>
           </a:p>
@@ -12466,17 +12309,8 @@
             </a:pPr>
             <a:r>
               <a:rPr lang="en-US" dirty="0" smtClean="0"/>
-              <a:t>S1 </a:t>
-            </a:r>
-            <a:r>
-              <a:rPr lang="en-US" dirty="0" smtClean="0"/>
-              <a:t>S0 A B </a:t>
-            </a:r>
-            <a:r>
-              <a:rPr lang="en-US" dirty="0" smtClean="0"/>
-              <a:t>Result</a:t>
-            </a:r>
-            <a:endParaRPr lang="en-US" dirty="0" smtClean="0"/>
+              <a:t>S1 S0 A B Result</a:t>
+            </a:r>
           </a:p>
           <a:p>
             <a:pPr marL="342900" lvl="0" indent="-342900">
@@ -12585,13 +12419,8 @@
             </a:pPr>
             <a:r>
               <a:rPr lang="en-US" dirty="0" smtClean="0"/>
-              <a:t>0 1 1 1 </a:t>
-            </a:r>
-            <a:r>
-              <a:rPr lang="en-US" dirty="0" smtClean="0"/>
-              <a:t>1</a:t>
-            </a:r>
-            <a:endParaRPr lang="en-US" dirty="0" smtClean="0"/>
+              <a:t>0 1 1 1 1</a:t>
+            </a:r>
           </a:p>
         </p:txBody>
       </p:sp>
@@ -13901,15 +13730,7 @@
           <a:p>
             <a:r>
               <a:rPr lang="de-DE" dirty="0" smtClean="0"/>
-              <a:t>5</a:t>
-            </a:r>
-            <a:r>
-              <a:rPr lang="de-DE" dirty="0" smtClean="0"/>
-              <a:t>: </a:t>
-            </a:r>
-            <a:r>
-              <a:rPr lang="de-DE" dirty="0" smtClean="0"/>
-              <a:t>Multiplexer 2:1</a:t>
+              <a:t>5: Multiplexer 2:1</a:t>
             </a:r>
             <a:endParaRPr lang="de-DE" dirty="0"/>
           </a:p>
@@ -14502,19 +14323,7 @@
             </a:pPr>
             <a:r>
               <a:rPr lang="en-US" dirty="0" smtClean="0"/>
-              <a:t>	</a:t>
-            </a:r>
-            <a:r>
-              <a:rPr lang="en-US" dirty="0" smtClean="0"/>
-              <a:t>		</a:t>
-            </a:r>
-            <a:r>
-              <a:rPr lang="en-US" dirty="0" smtClean="0"/>
-              <a:t> </a:t>
-            </a:r>
-            <a:r>
-              <a:rPr lang="en-US" dirty="0" smtClean="0"/>
-              <a:t>           Boolean expression</a:t>
+              <a:t>			            Boolean expression</a:t>
             </a:r>
             <a:endParaRPr lang="fr-FR" dirty="0" smtClean="0"/>
           </a:p>
@@ -14602,15 +14411,7 @@
           <a:p>
             <a:r>
               <a:rPr lang="de-DE" dirty="0" smtClean="0"/>
-              <a:t>6.1</a:t>
-            </a:r>
-            <a:r>
-              <a:rPr lang="de-DE" dirty="0" smtClean="0"/>
-              <a:t>: </a:t>
-            </a:r>
-            <a:r>
-              <a:rPr lang="de-DE" dirty="0" smtClean="0"/>
-              <a:t>ALU 1bit</a:t>
+              <a:t>6.1: ALU 1bit</a:t>
             </a:r>
             <a:endParaRPr lang="de-DE" dirty="0"/>
           </a:p>
@@ -14917,13 +14718,8 @@
             </a:pPr>
             <a:r>
               <a:rPr lang="en-US" sz="1100" dirty="0" smtClean="0"/>
-              <a:t>0 0 1 1 1 1 1 </a:t>
-            </a:r>
-            <a:r>
-              <a:rPr lang="en-US" sz="1100" dirty="0" smtClean="0"/>
-              <a:t>1</a:t>
-            </a:r>
-            <a:endParaRPr lang="en-US" sz="1100" dirty="0" smtClean="0"/>
+              <a:t>0 0 1 1 1 1 1 1</a:t>
+            </a:r>
           </a:p>
         </p:txBody>
       </p:sp>
@@ -17470,7 +17266,7 @@
           <p:cNvPr id="5" name="Content Placeholder 4" descr="A piece of paper with writing on it&#10;&#10;Description automatically generated">
             <a:extLst>
               <a:ext uri="{FF2B5EF4-FFF2-40B4-BE49-F238E27FC236}">
-                <a16:creationId xmlns:a16="http://schemas.microsoft.com/office/drawing/2014/main" xmlns="" id="{AA8424CA-F217-6983-FCC4-E322FAC05AC1}"/>
+                <a16:creationId xmlns="" xmlns:a16="http://schemas.microsoft.com/office/drawing/2014/main" id="{AA8424CA-F217-6983-FCC4-E322FAC05AC1}"/>
               </a:ext>
             </a:extLst>
           </p:cNvPr>
@@ -17483,7 +17279,7 @@
           <a:blip r:embed="rId2">
             <a:extLst>
               <a:ext uri="{28A0092B-C50C-407E-A947-70E740481C1C}">
-                <a14:useLocalDpi xmlns:a14="http://schemas.microsoft.com/office/drawing/2010/main" xmlns="" val="0"/>
+                <a14:useLocalDpi xmlns="" xmlns:a14="http://schemas.microsoft.com/office/drawing/2010/main" val="0"/>
               </a:ext>
             </a:extLst>
           </a:blip>
@@ -17622,7 +17418,7 @@
       </p:sp>
       <p:pic>
         <p:nvPicPr>
-          <p:cNvPr id="14338" name="Picture 2" descr="C:\Privat\_Studium\BSC_6\DDC\project1\DDC-Assignment\Adders\logism_half_adder.png"/>
+          <p:cNvPr id="1026" name="Picture 2" descr="C:\Privat\_Studium\BSC_6\DDC\project1\DDC-Assignment\Adders\logism_half_adder.png"/>
           <p:cNvPicPr>
             <a:picLocks noChangeAspect="1" noChangeArrowheads="1"/>
           </p:cNvPicPr>
@@ -17637,8 +17433,8 @@
         </p:blipFill>
         <p:spPr bwMode="auto">
           <a:xfrm>
-            <a:off x="0" y="2000240"/>
-            <a:ext cx="9144000" cy="3700356"/>
+            <a:off x="0" y="2051490"/>
+            <a:ext cx="9144000" cy="3592088"/>
           </a:xfrm>
           <a:prstGeom prst="rect">
             <a:avLst/>
@@ -17725,7 +17521,7 @@
           <p:cNvPr id="5" name="Content Placeholder 4" descr="A piece of paper with writing on it&#10;&#10;Description automatically generated">
             <a:extLst>
               <a:ext uri="{FF2B5EF4-FFF2-40B4-BE49-F238E27FC236}">
-                <a16:creationId xmlns:a16="http://schemas.microsoft.com/office/drawing/2014/main" xmlns="" id="{AA8424CA-F217-6983-FCC4-E322FAC05AC1}"/>
+                <a16:creationId xmlns="" xmlns:a16="http://schemas.microsoft.com/office/drawing/2014/main" id="{AA8424CA-F217-6983-FCC4-E322FAC05AC1}"/>
               </a:ext>
             </a:extLst>
           </p:cNvPr>
@@ -17738,7 +17534,7 @@
           <a:blip r:embed="rId2">
             <a:extLst>
               <a:ext uri="{28A0092B-C50C-407E-A947-70E740481C1C}">
-                <a14:useLocalDpi xmlns:a14="http://schemas.microsoft.com/office/drawing/2010/main" xmlns="" val="0"/>
+                <a14:useLocalDpi xmlns="" xmlns:a14="http://schemas.microsoft.com/office/drawing/2010/main" val="0"/>
               </a:ext>
             </a:extLst>
           </a:blip>
@@ -17762,7 +17558,7 @@
           <p:cNvPr id="6" name="Content Placeholder 4" descr="A piece of paper with writing on it&#10;&#10;Description automatically generated">
             <a:extLst>
               <a:ext uri="{FF2B5EF4-FFF2-40B4-BE49-F238E27FC236}">
-                <a16:creationId xmlns:a16="http://schemas.microsoft.com/office/drawing/2014/main" xmlns="" id="{AA8424CA-F217-6983-FCC4-E322FAC05AC1}"/>
+                <a16:creationId xmlns="" xmlns:a16="http://schemas.microsoft.com/office/drawing/2014/main" id="{AA8424CA-F217-6983-FCC4-E322FAC05AC1}"/>
               </a:ext>
             </a:extLst>
           </p:cNvPr>
@@ -17775,7 +17571,7 @@
           <a:blip r:embed="rId2">
             <a:extLst>
               <a:ext uri="{28A0092B-C50C-407E-A947-70E740481C1C}">
-                <a14:useLocalDpi xmlns:a14="http://schemas.microsoft.com/office/drawing/2010/main" xmlns="" val="0"/>
+                <a14:useLocalDpi xmlns="" xmlns:a14="http://schemas.microsoft.com/office/drawing/2010/main" val="0"/>
               </a:ext>
             </a:extLst>
           </a:blip>

</xml_diff>